<commit_message>
Revise and include mapping data.
</commit_message>
<xml_diff>
--- a/Introduction to Python.pptx
+++ b/Introduction to Python.pptx
@@ -5,19 +5,24 @@
     <p:sldMasterId id="2147483660" r:id="rId1"/>
   </p:sldMasterIdLst>
   <p:notesMasterIdLst>
-    <p:notesMasterId r:id="rId12"/>
+    <p:notesMasterId r:id="rId17"/>
   </p:notesMasterIdLst>
   <p:sldIdLst>
     <p:sldId id="256" r:id="rId2"/>
-    <p:sldId id="264" r:id="rId3"/>
-    <p:sldId id="270" r:id="rId4"/>
-    <p:sldId id="271" r:id="rId5"/>
-    <p:sldId id="272" r:id="rId6"/>
-    <p:sldId id="265" r:id="rId7"/>
-    <p:sldId id="267" r:id="rId8"/>
-    <p:sldId id="260" r:id="rId9"/>
-    <p:sldId id="261" r:id="rId10"/>
-    <p:sldId id="258" r:id="rId11"/>
+    <p:sldId id="274" r:id="rId3"/>
+    <p:sldId id="271" r:id="rId4"/>
+    <p:sldId id="275" r:id="rId5"/>
+    <p:sldId id="264" r:id="rId6"/>
+    <p:sldId id="270" r:id="rId7"/>
+    <p:sldId id="272" r:id="rId8"/>
+    <p:sldId id="265" r:id="rId9"/>
+    <p:sldId id="267" r:id="rId10"/>
+    <p:sldId id="273" r:id="rId11"/>
+    <p:sldId id="258" r:id="rId12"/>
+    <p:sldId id="260" r:id="rId13"/>
+    <p:sldId id="261" r:id="rId14"/>
+    <p:sldId id="276" r:id="rId15"/>
+    <p:sldId id="277" r:id="rId16"/>
   </p:sldIdLst>
   <p:sldSz cx="12192000" cy="6858000"/>
   <p:notesSz cx="6858000" cy="9144000"/>
@@ -206,7 +211,7 @@
           <a:p>
             <a:fld id="{1625BD86-A277-4756-AFD6-158CB1C0F478}" type="datetimeFigureOut">
               <a:rPr lang="en-US" smtClean="0"/>
-              <a:t>1/22/2019</a:t>
+              <a:t>2/7/2019</a:t>
             </a:fld>
             <a:endParaRPr lang="en-US" dirty="0"/>
           </a:p>
@@ -605,7 +610,7 @@
           <a:p>
             <a:fld id="{456B5467-EA77-4FF9-8BC4-2EA8FCAB53DA}" type="datetimeFigureOut">
               <a:rPr lang="en-US" smtClean="0"/>
-              <a:t>1/22/2019</a:t>
+              <a:t>2/7/2019</a:t>
             </a:fld>
             <a:endParaRPr lang="en-US" dirty="0"/>
           </a:p>
@@ -775,7 +780,7 @@
           <a:p>
             <a:fld id="{456B5467-EA77-4FF9-8BC4-2EA8FCAB53DA}" type="datetimeFigureOut">
               <a:rPr lang="en-US" smtClean="0"/>
-              <a:t>1/22/2019</a:t>
+              <a:t>2/7/2019</a:t>
             </a:fld>
             <a:endParaRPr lang="en-US" dirty="0"/>
           </a:p>
@@ -955,7 +960,7 @@
           <a:p>
             <a:fld id="{456B5467-EA77-4FF9-8BC4-2EA8FCAB53DA}" type="datetimeFigureOut">
               <a:rPr lang="en-US" smtClean="0"/>
-              <a:t>1/22/2019</a:t>
+              <a:t>2/7/2019</a:t>
             </a:fld>
             <a:endParaRPr lang="en-US" dirty="0"/>
           </a:p>
@@ -1125,7 +1130,7 @@
           <a:p>
             <a:fld id="{456B5467-EA77-4FF9-8BC4-2EA8FCAB53DA}" type="datetimeFigureOut">
               <a:rPr lang="en-US" smtClean="0"/>
-              <a:t>1/22/2019</a:t>
+              <a:t>2/7/2019</a:t>
             </a:fld>
             <a:endParaRPr lang="en-US" dirty="0"/>
           </a:p>
@@ -1371,7 +1376,7 @@
           <a:p>
             <a:fld id="{456B5467-EA77-4FF9-8BC4-2EA8FCAB53DA}" type="datetimeFigureOut">
               <a:rPr lang="en-US" smtClean="0"/>
-              <a:t>1/22/2019</a:t>
+              <a:t>2/7/2019</a:t>
             </a:fld>
             <a:endParaRPr lang="en-US" dirty="0"/>
           </a:p>
@@ -1603,7 +1608,7 @@
           <a:p>
             <a:fld id="{456B5467-EA77-4FF9-8BC4-2EA8FCAB53DA}" type="datetimeFigureOut">
               <a:rPr lang="en-US" smtClean="0"/>
-              <a:t>1/22/2019</a:t>
+              <a:t>2/7/2019</a:t>
             </a:fld>
             <a:endParaRPr lang="en-US" dirty="0"/>
           </a:p>
@@ -1970,7 +1975,7 @@
           <a:p>
             <a:fld id="{456B5467-EA77-4FF9-8BC4-2EA8FCAB53DA}" type="datetimeFigureOut">
               <a:rPr lang="en-US" smtClean="0"/>
-              <a:t>1/22/2019</a:t>
+              <a:t>2/7/2019</a:t>
             </a:fld>
             <a:endParaRPr lang="en-US" dirty="0"/>
           </a:p>
@@ -2088,7 +2093,7 @@
           <a:p>
             <a:fld id="{456B5467-EA77-4FF9-8BC4-2EA8FCAB53DA}" type="datetimeFigureOut">
               <a:rPr lang="en-US" smtClean="0"/>
-              <a:t>1/22/2019</a:t>
+              <a:t>2/7/2019</a:t>
             </a:fld>
             <a:endParaRPr lang="en-US" dirty="0"/>
           </a:p>
@@ -2183,7 +2188,7 @@
           <a:p>
             <a:fld id="{456B5467-EA77-4FF9-8BC4-2EA8FCAB53DA}" type="datetimeFigureOut">
               <a:rPr lang="en-US" smtClean="0"/>
-              <a:t>1/22/2019</a:t>
+              <a:t>2/7/2019</a:t>
             </a:fld>
             <a:endParaRPr lang="en-US" dirty="0"/>
           </a:p>
@@ -2460,7 +2465,7 @@
           <a:p>
             <a:fld id="{456B5467-EA77-4FF9-8BC4-2EA8FCAB53DA}" type="datetimeFigureOut">
               <a:rPr lang="en-US" smtClean="0"/>
-              <a:t>1/22/2019</a:t>
+              <a:t>2/7/2019</a:t>
             </a:fld>
             <a:endParaRPr lang="en-US" dirty="0"/>
           </a:p>
@@ -2717,7 +2722,7 @@
           <a:p>
             <a:fld id="{456B5467-EA77-4FF9-8BC4-2EA8FCAB53DA}" type="datetimeFigureOut">
               <a:rPr lang="en-US" smtClean="0"/>
-              <a:t>1/22/2019</a:t>
+              <a:t>2/7/2019</a:t>
             </a:fld>
             <a:endParaRPr lang="en-US" dirty="0"/>
           </a:p>
@@ -2930,7 +2935,7 @@
           <a:p>
             <a:fld id="{456B5467-EA77-4FF9-8BC4-2EA8FCAB53DA}" type="datetimeFigureOut">
               <a:rPr lang="en-US" smtClean="0"/>
-              <a:t>1/22/2019</a:t>
+              <a:t>2/7/2019</a:t>
             </a:fld>
             <a:endParaRPr lang="en-US" dirty="0"/>
           </a:p>
@@ -3375,19 +3380,14 @@
           <a:p>
             <a:r>
               <a:rPr lang="en-US" dirty="0" smtClean="0"/>
-              <a:t>January 22, 2019</a:t>
+              <a:t>February 7, 2019</a:t>
             </a:r>
           </a:p>
           <a:p>
             <a:r>
               <a:rPr lang="en-US" dirty="0" smtClean="0"/>
-              <a:t>Mike Babb, </a:t>
-            </a:r>
-            <a:r>
-              <a:rPr lang="en-US" dirty="0" smtClean="0"/>
-              <a:t>Ph.C.</a:t>
-            </a:r>
-            <a:endParaRPr lang="en-US" dirty="0" smtClean="0"/>
+              <a:t>Mike Babb, Ph.C.</a:t>
+            </a:r>
           </a:p>
           <a:p>
             <a:r>
@@ -3449,6 +3449,90 @@
 </file>
 
 <file path=ppt/slides/slide10.xml><?xml version="1.0" encoding="utf-8"?>
+<p:sld xmlns:a="http://schemas.openxmlformats.org/drawingml/2006/main" xmlns:r="http://schemas.openxmlformats.org/officeDocument/2006/relationships" xmlns:p="http://schemas.openxmlformats.org/presentationml/2006/main">
+  <p:cSld>
+    <p:spTree>
+      <p:nvGrpSpPr>
+        <p:cNvPr id="1" name=""/>
+        <p:cNvGrpSpPr/>
+        <p:nvPr/>
+      </p:nvGrpSpPr>
+      <p:grpSpPr>
+        <a:xfrm>
+          <a:off x="0" y="0"/>
+          <a:ext cx="0" cy="0"/>
+          <a:chOff x="0" y="0"/>
+          <a:chExt cx="0" cy="0"/>
+        </a:xfrm>
+      </p:grpSpPr>
+      <p:sp>
+        <p:nvSpPr>
+          <p:cNvPr id="2" name="Title 1"/>
+          <p:cNvSpPr>
+            <a:spLocks noGrp="1"/>
+          </p:cNvSpPr>
+          <p:nvPr>
+            <p:ph type="title"/>
+          </p:nvPr>
+        </p:nvSpPr>
+        <p:spPr/>
+        <p:txBody>
+          <a:bodyPr/>
+          <a:lstStyle/>
+          <a:p>
+            <a:r>
+              <a:rPr lang="en-US" dirty="0" smtClean="0"/>
+              <a:t>Jupyter Notebook Terminal</a:t>
+            </a:r>
+            <a:endParaRPr lang="en-US" dirty="0"/>
+          </a:p>
+        </p:txBody>
+      </p:sp>
+      <p:pic>
+        <p:nvPicPr>
+          <p:cNvPr id="3" name="Picture 2"/>
+          <p:cNvPicPr>
+            <a:picLocks noChangeAspect="1"/>
+          </p:cNvPicPr>
+          <p:nvPr/>
+        </p:nvPicPr>
+        <p:blipFill>
+          <a:blip r:embed="rId2"/>
+          <a:stretch>
+            <a:fillRect/>
+          </a:stretch>
+        </p:blipFill>
+        <p:spPr>
+          <a:xfrm>
+            <a:off x="838200" y="1295827"/>
+            <a:ext cx="10122794" cy="5394871"/>
+          </a:xfrm>
+          <a:prstGeom prst="rect">
+            <a:avLst/>
+          </a:prstGeom>
+        </p:spPr>
+      </p:pic>
+    </p:spTree>
+    <p:extLst>
+      <p:ext uri="{BB962C8B-B14F-4D97-AF65-F5344CB8AC3E}">
+        <p14:creationId xmlns:p14="http://schemas.microsoft.com/office/powerpoint/2010/main" val="2714205897"/>
+      </p:ext>
+    </p:extLst>
+  </p:cSld>
+  <p:clrMapOvr>
+    <a:masterClrMapping/>
+  </p:clrMapOvr>
+  <p:timing>
+    <p:tnLst>
+      <p:par>
+        <p:cTn id="1" dur="indefinite" restart="never" nodeType="tmRoot"/>
+      </p:par>
+    </p:tnLst>
+  </p:timing>
+</p:sld>
+</file>
+
+<file path=ppt/slides/slide11.xml><?xml version="1.0" encoding="utf-8"?>
 <p:sld xmlns:a="http://schemas.openxmlformats.org/drawingml/2006/main" xmlns:r="http://schemas.openxmlformats.org/officeDocument/2006/relationships" xmlns:p="http://schemas.openxmlformats.org/presentationml/2006/main">
   <p:cSld>
     <p:spTree>
@@ -3619,822 +3703,7 @@
 </p:sld>
 </file>
 
-<file path=ppt/slides/slide2.xml><?xml version="1.0" encoding="utf-8"?>
-<p:sld xmlns:a="http://schemas.openxmlformats.org/drawingml/2006/main" xmlns:r="http://schemas.openxmlformats.org/officeDocument/2006/relationships" xmlns:p="http://schemas.openxmlformats.org/presentationml/2006/main">
-  <p:cSld>
-    <p:spTree>
-      <p:nvGrpSpPr>
-        <p:cNvPr id="1" name=""/>
-        <p:cNvGrpSpPr/>
-        <p:nvPr/>
-      </p:nvGrpSpPr>
-      <p:grpSpPr>
-        <a:xfrm>
-          <a:off x="0" y="0"/>
-          <a:ext cx="0" cy="0"/>
-          <a:chOff x="0" y="0"/>
-          <a:chExt cx="0" cy="0"/>
-        </a:xfrm>
-      </p:grpSpPr>
-      <p:sp>
-        <p:nvSpPr>
-          <p:cNvPr id="2" name="Title 1"/>
-          <p:cNvSpPr>
-            <a:spLocks noGrp="1"/>
-          </p:cNvSpPr>
-          <p:nvPr>
-            <p:ph type="title"/>
-          </p:nvPr>
-        </p:nvSpPr>
-        <p:spPr/>
-        <p:txBody>
-          <a:bodyPr/>
-          <a:lstStyle/>
-          <a:p>
-            <a:r>
-              <a:rPr lang="en-US" dirty="0" smtClean="0"/>
-              <a:t>Why python?</a:t>
-            </a:r>
-            <a:endParaRPr lang="en-US" dirty="0"/>
-          </a:p>
-        </p:txBody>
-      </p:sp>
-      <p:sp>
-        <p:nvSpPr>
-          <p:cNvPr id="3" name="Content Placeholder 2"/>
-          <p:cNvSpPr>
-            <a:spLocks noGrp="1"/>
-          </p:cNvSpPr>
-          <p:nvPr>
-            <p:ph idx="1"/>
-          </p:nvPr>
-        </p:nvSpPr>
-        <p:spPr/>
-        <p:txBody>
-          <a:bodyPr>
-            <a:normAutofit fontScale="92500" lnSpcReduction="20000"/>
-          </a:bodyPr>
-          <a:lstStyle/>
-          <a:p>
-            <a:pPr>
-              <a:buFont typeface="Arial" panose="020B0604020202020204" pitchFamily="34" charset="0"/>
-              <a:buChar char="•"/>
-            </a:pPr>
-            <a:r>
-              <a:rPr lang="en-US" dirty="0" smtClean="0"/>
-              <a:t>It’s easy to jump in: </a:t>
-            </a:r>
-            <a:r>
-              <a:rPr lang="en-US" dirty="0" smtClean="0">
-                <a:hlinkClick r:id="rId2"/>
-              </a:rPr>
-              <a:t>https</a:t>
-            </a:r>
-            <a:r>
-              <a:rPr lang="en-US" dirty="0">
-                <a:hlinkClick r:id="rId2"/>
-              </a:rPr>
-              <a:t>://www.python.org/about/gettingstarted</a:t>
-            </a:r>
-            <a:r>
-              <a:rPr lang="en-US" dirty="0" smtClean="0">
-                <a:hlinkClick r:id="rId2"/>
-              </a:rPr>
-              <a:t>/</a:t>
-            </a:r>
-            <a:endParaRPr lang="en-US" dirty="0" smtClean="0"/>
-          </a:p>
-          <a:p>
-            <a:pPr>
-              <a:buFont typeface="Arial" panose="020B0604020202020204" pitchFamily="34" charset="0"/>
-              <a:buChar char="•"/>
-            </a:pPr>
-            <a:r>
-              <a:rPr lang="en-US" dirty="0" smtClean="0"/>
-              <a:t>It’s cross-platform: Windows, Mac, Linux</a:t>
-            </a:r>
-          </a:p>
-          <a:p>
-            <a:pPr>
-              <a:buFont typeface="Arial" panose="020B0604020202020204" pitchFamily="34" charset="0"/>
-              <a:buChar char="•"/>
-            </a:pPr>
-            <a:r>
-              <a:rPr lang="en-US" dirty="0" smtClean="0"/>
-              <a:t>It was designed to be simple and readable: </a:t>
-            </a:r>
-            <a:r>
-              <a:rPr lang="en-US" dirty="0" smtClean="0">
-                <a:hlinkClick r:id="rId3"/>
-              </a:rPr>
-              <a:t>https</a:t>
-            </a:r>
-            <a:r>
-              <a:rPr lang="en-US" dirty="0">
-                <a:hlinkClick r:id="rId3"/>
-              </a:rPr>
-              <a:t>://xkcd.com/353</a:t>
-            </a:r>
-            <a:r>
-              <a:rPr lang="en-US" dirty="0" smtClean="0">
-                <a:hlinkClick r:id="rId3"/>
-              </a:rPr>
-              <a:t>/</a:t>
-            </a:r>
-            <a:endParaRPr lang="en-US" dirty="0" smtClean="0"/>
-          </a:p>
-          <a:p>
-            <a:r>
-              <a:rPr lang="en-US" dirty="0"/>
-              <a:t>It’s free</a:t>
-            </a:r>
-            <a:r>
-              <a:rPr lang="en-US" dirty="0" smtClean="0"/>
-              <a:t>!</a:t>
-            </a:r>
-          </a:p>
-          <a:p>
-            <a:r>
-              <a:rPr lang="en-US" dirty="0" smtClean="0"/>
-              <a:t>It’s popular: </a:t>
-            </a:r>
-            <a:r>
-              <a:rPr lang="en-US" dirty="0" smtClean="0">
-                <a:hlinkClick r:id="rId4"/>
-              </a:rPr>
-              <a:t>https</a:t>
-            </a:r>
-            <a:r>
-              <a:rPr lang="en-US" dirty="0">
-                <a:hlinkClick r:id="rId4"/>
-              </a:rPr>
-              <a:t>://www.tiobe.com/tiobe-index/python</a:t>
-            </a:r>
-            <a:r>
-              <a:rPr lang="en-US" dirty="0" smtClean="0">
-                <a:hlinkClick r:id="rId4"/>
-              </a:rPr>
-              <a:t>/</a:t>
-            </a:r>
-            <a:endParaRPr lang="en-US" dirty="0" smtClean="0"/>
-          </a:p>
-          <a:p>
-            <a:pPr>
-              <a:buFont typeface="Arial" panose="020B0604020202020204" pitchFamily="34" charset="0"/>
-              <a:buChar char="•"/>
-            </a:pPr>
-            <a:r>
-              <a:rPr lang="en-US" dirty="0" smtClean="0"/>
-              <a:t>It’s prolific: used in many industries for many jobs. Finance, real estate tech, server administration, health care research, non-profit administration</a:t>
-            </a:r>
-          </a:p>
-          <a:p>
-            <a:pPr>
-              <a:buFont typeface="Arial" panose="020B0604020202020204" pitchFamily="34" charset="0"/>
-              <a:buChar char="•"/>
-            </a:pPr>
-            <a:r>
-              <a:rPr lang="en-US" dirty="0" smtClean="0"/>
-              <a:t>And departments across campus: sociology, economics, civil engineering, astronomy</a:t>
-            </a:r>
-          </a:p>
-          <a:p>
-            <a:pPr>
-              <a:buFont typeface="Arial" panose="020B0604020202020204" pitchFamily="34" charset="0"/>
-              <a:buChar char="•"/>
-            </a:pPr>
-            <a:r>
-              <a:rPr lang="en-US" dirty="0" smtClean="0"/>
-              <a:t>Many libraries that do pretty much what you want with just a few commands</a:t>
-            </a:r>
-          </a:p>
-          <a:p>
-            <a:pPr>
-              <a:buFont typeface="Arial" panose="020B0604020202020204" pitchFamily="34" charset="0"/>
-              <a:buChar char="•"/>
-            </a:pPr>
-            <a:endParaRPr lang="en-US" dirty="0"/>
-          </a:p>
-        </p:txBody>
-      </p:sp>
-    </p:spTree>
-    <p:extLst>
-      <p:ext uri="{BB962C8B-B14F-4D97-AF65-F5344CB8AC3E}">
-        <p14:creationId xmlns:p14="http://schemas.microsoft.com/office/powerpoint/2010/main" val="3321498620"/>
-      </p:ext>
-    </p:extLst>
-  </p:cSld>
-  <p:clrMapOvr>
-    <a:masterClrMapping/>
-  </p:clrMapOvr>
-  <p:timing>
-    <p:tnLst>
-      <p:par>
-        <p:cTn id="1" dur="indefinite" restart="never" nodeType="tmRoot"/>
-      </p:par>
-    </p:tnLst>
-  </p:timing>
-</p:sld>
-</file>
-
-<file path=ppt/slides/slide3.xml><?xml version="1.0" encoding="utf-8"?>
-<p:sld xmlns:a="http://schemas.openxmlformats.org/drawingml/2006/main" xmlns:r="http://schemas.openxmlformats.org/officeDocument/2006/relationships" xmlns:p="http://schemas.openxmlformats.org/presentationml/2006/main">
-  <p:cSld>
-    <p:spTree>
-      <p:nvGrpSpPr>
-        <p:cNvPr id="1" name=""/>
-        <p:cNvGrpSpPr/>
-        <p:nvPr/>
-      </p:nvGrpSpPr>
-      <p:grpSpPr>
-        <a:xfrm>
-          <a:off x="0" y="0"/>
-          <a:ext cx="0" cy="0"/>
-          <a:chOff x="0" y="0"/>
-          <a:chExt cx="0" cy="0"/>
-        </a:xfrm>
-      </p:grpSpPr>
-      <p:sp>
-        <p:nvSpPr>
-          <p:cNvPr id="2" name="Title 1"/>
-          <p:cNvSpPr>
-            <a:spLocks noGrp="1"/>
-          </p:cNvSpPr>
-          <p:nvPr>
-            <p:ph type="title"/>
-          </p:nvPr>
-        </p:nvSpPr>
-        <p:spPr/>
-        <p:txBody>
-          <a:bodyPr/>
-          <a:lstStyle/>
-          <a:p>
-            <a:r>
-              <a:rPr lang="en-US" dirty="0" smtClean="0"/>
-              <a:t>Brief history</a:t>
-            </a:r>
-            <a:endParaRPr lang="en-US" dirty="0"/>
-          </a:p>
-        </p:txBody>
-      </p:sp>
-      <p:sp>
-        <p:nvSpPr>
-          <p:cNvPr id="3" name="Content Placeholder 2"/>
-          <p:cNvSpPr>
-            <a:spLocks noGrp="1"/>
-          </p:cNvSpPr>
-          <p:nvPr>
-            <p:ph idx="1"/>
-          </p:nvPr>
-        </p:nvSpPr>
-        <p:spPr/>
-        <p:txBody>
-          <a:bodyPr/>
-          <a:lstStyle/>
-          <a:p>
-            <a:r>
-              <a:rPr lang="en-US" dirty="0" smtClean="0"/>
-              <a:t>Developed by Guido van Rossum in the early 90s. Current versions</a:t>
-            </a:r>
-            <a:r>
-              <a:rPr lang="en-US" dirty="0"/>
-              <a:t>: Python </a:t>
-            </a:r>
-            <a:r>
-              <a:rPr lang="en-US" dirty="0" smtClean="0"/>
-              <a:t>3.7.2 </a:t>
-            </a:r>
-            <a:r>
-              <a:rPr lang="en-US" dirty="0"/>
-              <a:t>and Python </a:t>
-            </a:r>
-            <a:r>
-              <a:rPr lang="en-US" dirty="0" smtClean="0"/>
-              <a:t>2.7.15</a:t>
-            </a:r>
-          </a:p>
-          <a:p>
-            <a:r>
-              <a:rPr lang="en-US" dirty="0" smtClean="0"/>
-              <a:t>Python 3.7 is van Rossum’s (and the larger community’s) attempt at fixing some core issues with python 2.x</a:t>
-            </a:r>
-          </a:p>
-          <a:p>
-            <a:pPr lvl="1"/>
-            <a:r>
-              <a:rPr lang="en-US" dirty="0" smtClean="0"/>
-              <a:t>Integer division returns floats</a:t>
-            </a:r>
-          </a:p>
-          <a:p>
-            <a:pPr lvl="1"/>
-            <a:r>
-              <a:rPr lang="en-US" dirty="0" smtClean="0"/>
-              <a:t>Better handling of strings</a:t>
-            </a:r>
-          </a:p>
-          <a:p>
-            <a:pPr lvl="1"/>
-            <a:r>
-              <a:rPr lang="en-US" dirty="0" smtClean="0"/>
-              <a:t>Better memory management in some cases</a:t>
-            </a:r>
-          </a:p>
-          <a:p>
-            <a:pPr lvl="1"/>
-            <a:r>
-              <a:rPr lang="en-US" dirty="0" smtClean="0"/>
-              <a:t>It’s </a:t>
-            </a:r>
-            <a:r>
-              <a:rPr lang="en-US" dirty="0"/>
-              <a:t>a bit faster in general: </a:t>
-            </a:r>
-            <a:r>
-              <a:rPr lang="en-US" dirty="0">
-                <a:hlinkClick r:id="rId2"/>
-              </a:rPr>
-              <a:t>https://</a:t>
-            </a:r>
-            <a:r>
-              <a:rPr lang="en-US" dirty="0" smtClean="0">
-                <a:hlinkClick r:id="rId2"/>
-              </a:rPr>
-              <a:t>hackernoon.com/which-is-the-fastest-version-of-python-2ae7c61a6b2b</a:t>
-            </a:r>
-            <a:endParaRPr lang="en-US" dirty="0" smtClean="0"/>
-          </a:p>
-          <a:p>
-            <a:pPr marL="457200" lvl="1" indent="0">
-              <a:buNone/>
-            </a:pPr>
-            <a:endParaRPr lang="en-US" dirty="0" smtClean="0"/>
-          </a:p>
-        </p:txBody>
-      </p:sp>
-    </p:spTree>
-    <p:extLst>
-      <p:ext uri="{BB962C8B-B14F-4D97-AF65-F5344CB8AC3E}">
-        <p14:creationId xmlns:p14="http://schemas.microsoft.com/office/powerpoint/2010/main" val="3428809214"/>
-      </p:ext>
-    </p:extLst>
-  </p:cSld>
-  <p:clrMapOvr>
-    <a:masterClrMapping/>
-  </p:clrMapOvr>
-  <p:timing>
-    <p:tnLst>
-      <p:par>
-        <p:cTn id="1" dur="indefinite" restart="never" nodeType="tmRoot"/>
-      </p:par>
-    </p:tnLst>
-  </p:timing>
-</p:sld>
-</file>
-
-<file path=ppt/slides/slide4.xml><?xml version="1.0" encoding="utf-8"?>
-<p:sld xmlns:a="http://schemas.openxmlformats.org/drawingml/2006/main" xmlns:r="http://schemas.openxmlformats.org/officeDocument/2006/relationships" xmlns:p="http://schemas.openxmlformats.org/presentationml/2006/main">
-  <p:cSld>
-    <p:spTree>
-      <p:nvGrpSpPr>
-        <p:cNvPr id="1" name=""/>
-        <p:cNvGrpSpPr/>
-        <p:nvPr/>
-      </p:nvGrpSpPr>
-      <p:grpSpPr>
-        <a:xfrm>
-          <a:off x="0" y="0"/>
-          <a:ext cx="0" cy="0"/>
-          <a:chOff x="0" y="0"/>
-          <a:chExt cx="0" cy="0"/>
-        </a:xfrm>
-      </p:grpSpPr>
-      <p:sp>
-        <p:nvSpPr>
-          <p:cNvPr id="2" name="Title 1"/>
-          <p:cNvSpPr>
-            <a:spLocks noGrp="1"/>
-          </p:cNvSpPr>
-          <p:nvPr>
-            <p:ph type="title"/>
-          </p:nvPr>
-        </p:nvSpPr>
-        <p:spPr/>
-        <p:txBody>
-          <a:bodyPr/>
-          <a:lstStyle/>
-          <a:p>
-            <a:r>
-              <a:rPr lang="en-US" dirty="0" smtClean="0"/>
-              <a:t>Activities</a:t>
-            </a:r>
-            <a:endParaRPr lang="en-US" dirty="0"/>
-          </a:p>
-        </p:txBody>
-      </p:sp>
-      <p:sp>
-        <p:nvSpPr>
-          <p:cNvPr id="3" name="Content Placeholder 2"/>
-          <p:cNvSpPr>
-            <a:spLocks noGrp="1"/>
-          </p:cNvSpPr>
-          <p:nvPr>
-            <p:ph idx="1"/>
-          </p:nvPr>
-        </p:nvSpPr>
-        <p:spPr/>
-        <p:txBody>
-          <a:bodyPr/>
-          <a:lstStyle/>
-          <a:p>
-            <a:r>
-              <a:rPr lang="en-US" dirty="0" smtClean="0"/>
-              <a:t>Examine basic python syntax</a:t>
-            </a:r>
-          </a:p>
-          <a:p>
-            <a:r>
-              <a:rPr lang="en-US" dirty="0" smtClean="0"/>
-              <a:t>Using pandas, we will read in data pertaining to the age and sex of the population of Census Designated Places in Washington State during the 2013-2017 time period.</a:t>
-            </a:r>
-          </a:p>
-          <a:p>
-            <a:r>
-              <a:rPr lang="en-US" dirty="0" smtClean="0"/>
-              <a:t>Compute the all-ages sex-ratio</a:t>
-            </a:r>
-          </a:p>
-          <a:p>
-            <a:r>
-              <a:rPr lang="en-US" dirty="0" smtClean="0"/>
-              <a:t>Export the data to a .csv and an Excel workbook</a:t>
-            </a:r>
-            <a:endParaRPr lang="en-US" dirty="0"/>
-          </a:p>
-        </p:txBody>
-      </p:sp>
-    </p:spTree>
-    <p:extLst>
-      <p:ext uri="{BB962C8B-B14F-4D97-AF65-F5344CB8AC3E}">
-        <p14:creationId xmlns:p14="http://schemas.microsoft.com/office/powerpoint/2010/main" val="3030563835"/>
-      </p:ext>
-    </p:extLst>
-  </p:cSld>
-  <p:clrMapOvr>
-    <a:masterClrMapping/>
-  </p:clrMapOvr>
-  <p:timing>
-    <p:tnLst>
-      <p:par>
-        <p:cTn id="1" dur="indefinite" restart="never" nodeType="tmRoot"/>
-      </p:par>
-    </p:tnLst>
-  </p:timing>
-</p:sld>
-</file>
-
-<file path=ppt/slides/slide5.xml><?xml version="1.0" encoding="utf-8"?>
-<p:sld xmlns:a="http://schemas.openxmlformats.org/drawingml/2006/main" xmlns:r="http://schemas.openxmlformats.org/officeDocument/2006/relationships" xmlns:p="http://schemas.openxmlformats.org/presentationml/2006/main">
-  <p:cSld>
-    <p:spTree>
-      <p:nvGrpSpPr>
-        <p:cNvPr id="1" name=""/>
-        <p:cNvGrpSpPr/>
-        <p:nvPr/>
-      </p:nvGrpSpPr>
-      <p:grpSpPr>
-        <a:xfrm>
-          <a:off x="0" y="0"/>
-          <a:ext cx="0" cy="0"/>
-          <a:chOff x="0" y="0"/>
-          <a:chExt cx="0" cy="0"/>
-        </a:xfrm>
-      </p:grpSpPr>
-      <p:sp>
-        <p:nvSpPr>
-          <p:cNvPr id="2" name="Title 1"/>
-          <p:cNvSpPr>
-            <a:spLocks noGrp="1"/>
-          </p:cNvSpPr>
-          <p:nvPr>
-            <p:ph type="title"/>
-          </p:nvPr>
-        </p:nvSpPr>
-        <p:spPr/>
-        <p:txBody>
-          <a:bodyPr/>
-          <a:lstStyle/>
-          <a:p>
-            <a:r>
-              <a:rPr lang="en-US" dirty="0" smtClean="0"/>
-              <a:t>Pandas – Python Data Analysis Library</a:t>
-            </a:r>
-            <a:endParaRPr lang="en-US" dirty="0"/>
-          </a:p>
-        </p:txBody>
-      </p:sp>
-      <p:pic>
-        <p:nvPicPr>
-          <p:cNvPr id="3" name="Picture 2"/>
-          <p:cNvPicPr>
-            <a:picLocks noChangeAspect="1"/>
-          </p:cNvPicPr>
-          <p:nvPr/>
-        </p:nvPicPr>
-        <p:blipFill rotWithShape="1">
-          <a:blip r:embed="rId2"/>
-          <a:srcRect l="3548"/>
-          <a:stretch/>
-        </p:blipFill>
-        <p:spPr>
-          <a:xfrm>
-            <a:off x="923544" y="1591056"/>
-            <a:ext cx="7291922" cy="4806505"/>
-          </a:xfrm>
-          <a:prstGeom prst="rect">
-            <a:avLst/>
-          </a:prstGeom>
-        </p:spPr>
-      </p:pic>
-      <p:sp>
-        <p:nvSpPr>
-          <p:cNvPr id="4" name="TextBox 3"/>
-          <p:cNvSpPr txBox="1"/>
-          <p:nvPr/>
-        </p:nvSpPr>
-        <p:spPr>
-          <a:xfrm>
-            <a:off x="8300810" y="1591056"/>
-            <a:ext cx="3447288" cy="369332"/>
-          </a:xfrm>
-          <a:prstGeom prst="rect">
-            <a:avLst/>
-          </a:prstGeom>
-          <a:noFill/>
-        </p:spPr>
-        <p:txBody>
-          <a:bodyPr wrap="square" rtlCol="0">
-            <a:spAutoFit/>
-          </a:bodyPr>
-          <a:lstStyle/>
-          <a:p>
-            <a:r>
-              <a:rPr lang="en-US" dirty="0">
-                <a:hlinkClick r:id="rId3"/>
-              </a:rPr>
-              <a:t>https://pandas.pydata.org</a:t>
-            </a:r>
-            <a:r>
-              <a:rPr lang="en-US" dirty="0" smtClean="0">
-                <a:hlinkClick r:id="rId3"/>
-              </a:rPr>
-              <a:t>/</a:t>
-            </a:r>
-            <a:r>
-              <a:rPr lang="en-US" dirty="0" smtClean="0"/>
-              <a:t> </a:t>
-            </a:r>
-            <a:endParaRPr lang="en-US" dirty="0"/>
-          </a:p>
-        </p:txBody>
-      </p:sp>
-    </p:spTree>
-    <p:extLst>
-      <p:ext uri="{BB962C8B-B14F-4D97-AF65-F5344CB8AC3E}">
-        <p14:creationId xmlns:p14="http://schemas.microsoft.com/office/powerpoint/2010/main" val="2298993283"/>
-      </p:ext>
-    </p:extLst>
-  </p:cSld>
-  <p:clrMapOvr>
-    <a:masterClrMapping/>
-  </p:clrMapOvr>
-  <p:timing>
-    <p:tnLst>
-      <p:par>
-        <p:cTn id="1" dur="indefinite" restart="never" nodeType="tmRoot"/>
-      </p:par>
-    </p:tnLst>
-  </p:timing>
-</p:sld>
-</file>
-
-<file path=ppt/slides/slide6.xml><?xml version="1.0" encoding="utf-8"?>
-<p:sld xmlns:a="http://schemas.openxmlformats.org/drawingml/2006/main" xmlns:r="http://schemas.openxmlformats.org/officeDocument/2006/relationships" xmlns:p="http://schemas.openxmlformats.org/presentationml/2006/main">
-  <p:cSld>
-    <p:spTree>
-      <p:nvGrpSpPr>
-        <p:cNvPr id="1" name=""/>
-        <p:cNvGrpSpPr/>
-        <p:nvPr/>
-      </p:nvGrpSpPr>
-      <p:grpSpPr>
-        <a:xfrm>
-          <a:off x="0" y="0"/>
-          <a:ext cx="0" cy="0"/>
-          <a:chOff x="0" y="0"/>
-          <a:chExt cx="0" cy="0"/>
-        </a:xfrm>
-      </p:grpSpPr>
-      <p:sp>
-        <p:nvSpPr>
-          <p:cNvPr id="2" name="Title 1"/>
-          <p:cNvSpPr>
-            <a:spLocks noGrp="1"/>
-          </p:cNvSpPr>
-          <p:nvPr>
-            <p:ph type="title"/>
-          </p:nvPr>
-        </p:nvSpPr>
-        <p:spPr/>
-        <p:txBody>
-          <a:bodyPr/>
-          <a:lstStyle/>
-          <a:p>
-            <a:r>
-              <a:rPr lang="en-US" dirty="0" smtClean="0"/>
-              <a:t>Anaconda and the Jupyter Notebook</a:t>
-            </a:r>
-            <a:endParaRPr lang="en-US" dirty="0"/>
-          </a:p>
-        </p:txBody>
-      </p:sp>
-      <p:sp>
-        <p:nvSpPr>
-          <p:cNvPr id="3" name="Content Placeholder 2"/>
-          <p:cNvSpPr>
-            <a:spLocks noGrp="1"/>
-          </p:cNvSpPr>
-          <p:nvPr>
-            <p:ph idx="1"/>
-          </p:nvPr>
-        </p:nvSpPr>
-        <p:spPr/>
-        <p:txBody>
-          <a:bodyPr/>
-          <a:lstStyle/>
-          <a:p>
-            <a:r>
-              <a:rPr lang="en-US" dirty="0">
-                <a:hlinkClick r:id="rId2"/>
-              </a:rPr>
-              <a:t>https://www.anaconda.com</a:t>
-            </a:r>
-            <a:r>
-              <a:rPr lang="en-US" dirty="0" smtClean="0">
-                <a:hlinkClick r:id="rId2"/>
-              </a:rPr>
-              <a:t>/</a:t>
-            </a:r>
-            <a:r>
-              <a:rPr lang="en-US" dirty="0" smtClean="0"/>
-              <a:t> </a:t>
-            </a:r>
-          </a:p>
-          <a:p>
-            <a:r>
-              <a:rPr lang="en-US" dirty="0" smtClean="0"/>
-              <a:t>THE python data-science platform </a:t>
-            </a:r>
-          </a:p>
-          <a:p>
-            <a:r>
-              <a:rPr lang="en-US" dirty="0" smtClean="0"/>
-              <a:t>Facilitates interactive python</a:t>
-            </a:r>
-          </a:p>
-          <a:p>
-            <a:pPr>
-              <a:buFont typeface="Arial" panose="020B0604020202020204" pitchFamily="34" charset="0"/>
-              <a:buChar char="•"/>
-            </a:pPr>
-            <a:r>
-              <a:rPr lang="en-US" dirty="0" smtClean="0"/>
-              <a:t>Good for sharing and instruction</a:t>
-            </a:r>
-          </a:p>
-          <a:p>
-            <a:pPr>
-              <a:buFont typeface="Arial" panose="020B0604020202020204" pitchFamily="34" charset="0"/>
-              <a:buChar char="•"/>
-            </a:pPr>
-            <a:r>
-              <a:rPr lang="en-US" dirty="0" smtClean="0"/>
-              <a:t>Easy to break code into manageable chunks</a:t>
-            </a:r>
-          </a:p>
-          <a:p>
-            <a:pPr marL="0" indent="0">
-              <a:buNone/>
-            </a:pPr>
-            <a:endParaRPr lang="en-US" dirty="0" smtClean="0"/>
-          </a:p>
-        </p:txBody>
-      </p:sp>
-    </p:spTree>
-    <p:extLst>
-      <p:ext uri="{BB962C8B-B14F-4D97-AF65-F5344CB8AC3E}">
-        <p14:creationId xmlns:p14="http://schemas.microsoft.com/office/powerpoint/2010/main" val="3755854532"/>
-      </p:ext>
-    </p:extLst>
-  </p:cSld>
-  <p:clrMapOvr>
-    <a:masterClrMapping/>
-  </p:clrMapOvr>
-  <p:timing>
-    <p:tnLst>
-      <p:par>
-        <p:cTn id="1" dur="indefinite" restart="never" nodeType="tmRoot"/>
-      </p:par>
-    </p:tnLst>
-  </p:timing>
-</p:sld>
-</file>
-
-<file path=ppt/slides/slide7.xml><?xml version="1.0" encoding="utf-8"?>
-<p:sld xmlns:a="http://schemas.openxmlformats.org/drawingml/2006/main" xmlns:r="http://schemas.openxmlformats.org/officeDocument/2006/relationships" xmlns:p="http://schemas.openxmlformats.org/presentationml/2006/main">
-  <p:cSld>
-    <p:spTree>
-      <p:nvGrpSpPr>
-        <p:cNvPr id="1" name=""/>
-        <p:cNvGrpSpPr/>
-        <p:nvPr/>
-      </p:nvGrpSpPr>
-      <p:grpSpPr>
-        <a:xfrm>
-          <a:off x="0" y="0"/>
-          <a:ext cx="0" cy="0"/>
-          <a:chOff x="0" y="0"/>
-          <a:chExt cx="0" cy="0"/>
-        </a:xfrm>
-      </p:grpSpPr>
-      <p:sp>
-        <p:nvSpPr>
-          <p:cNvPr id="5" name="Title 4"/>
-          <p:cNvSpPr>
-            <a:spLocks noGrp="1"/>
-          </p:cNvSpPr>
-          <p:nvPr>
-            <p:ph type="title"/>
-          </p:nvPr>
-        </p:nvSpPr>
-        <p:spPr/>
-        <p:txBody>
-          <a:bodyPr/>
-          <a:lstStyle/>
-          <a:p>
-            <a:r>
-              <a:rPr lang="en-US" dirty="0" smtClean="0"/>
-              <a:t>Jupyter Notebook Homepage</a:t>
-            </a:r>
-            <a:endParaRPr lang="en-US" dirty="0"/>
-          </a:p>
-        </p:txBody>
-      </p:sp>
-      <p:pic>
-        <p:nvPicPr>
-          <p:cNvPr id="2" name="Picture 1"/>
-          <p:cNvPicPr>
-            <a:picLocks noChangeAspect="1"/>
-          </p:cNvPicPr>
-          <p:nvPr/>
-        </p:nvPicPr>
-        <p:blipFill>
-          <a:blip r:embed="rId2"/>
-          <a:stretch>
-            <a:fillRect/>
-          </a:stretch>
-        </p:blipFill>
-        <p:spPr>
-          <a:xfrm>
-            <a:off x="0" y="2215612"/>
-            <a:ext cx="12192000" cy="2426775"/>
-          </a:xfrm>
-          <a:prstGeom prst="rect">
-            <a:avLst/>
-          </a:prstGeom>
-        </p:spPr>
-      </p:pic>
-    </p:spTree>
-    <p:extLst>
-      <p:ext uri="{BB962C8B-B14F-4D97-AF65-F5344CB8AC3E}">
-        <p14:creationId xmlns:p14="http://schemas.microsoft.com/office/powerpoint/2010/main" val="2511325755"/>
-      </p:ext>
-    </p:extLst>
-  </p:cSld>
-  <p:clrMapOvr>
-    <a:masterClrMapping/>
-  </p:clrMapOvr>
-  <p:timing>
-    <p:tnLst>
-      <p:par>
-        <p:cTn id="1" dur="indefinite" restart="never" nodeType="tmRoot"/>
-      </p:par>
-    </p:tnLst>
-  </p:timing>
-</p:sld>
-</file>
-
-<file path=ppt/slides/slide8.xml><?xml version="1.0" encoding="utf-8"?>
+<file path=ppt/slides/slide12.xml><?xml version="1.0" encoding="utf-8"?>
 <p:sld xmlns:a="http://schemas.openxmlformats.org/drawingml/2006/main" xmlns:r="http://schemas.openxmlformats.org/officeDocument/2006/relationships" xmlns:p="http://schemas.openxmlformats.org/presentationml/2006/main">
   <p:cSld>
     <p:spTree>
@@ -4520,7 +3789,7 @@
 </p:sld>
 </file>
 
-<file path=ppt/slides/slide9.xml><?xml version="1.0" encoding="utf-8"?>
+<file path=ppt/slides/slide13.xml><?xml version="1.0" encoding="utf-8"?>
 <p:sld xmlns:a="http://schemas.openxmlformats.org/drawingml/2006/main" xmlns:r="http://schemas.openxmlformats.org/officeDocument/2006/relationships" xmlns:p="http://schemas.openxmlformats.org/presentationml/2006/main">
   <p:cSld>
     <p:spTree>
@@ -4590,6 +3859,1294 @@
     <p:extLst>
       <p:ext uri="{BB962C8B-B14F-4D97-AF65-F5344CB8AC3E}">
         <p14:creationId xmlns:p14="http://schemas.microsoft.com/office/powerpoint/2010/main" val="596040437"/>
+      </p:ext>
+    </p:extLst>
+  </p:cSld>
+  <p:clrMapOvr>
+    <a:masterClrMapping/>
+  </p:clrMapOvr>
+  <p:timing>
+    <p:tnLst>
+      <p:par>
+        <p:cTn id="1" dur="indefinite" restart="never" nodeType="tmRoot"/>
+      </p:par>
+    </p:tnLst>
+  </p:timing>
+</p:sld>
+</file>
+
+<file path=ppt/slides/slide14.xml><?xml version="1.0" encoding="utf-8"?>
+<p:sld xmlns:a="http://schemas.openxmlformats.org/drawingml/2006/main" xmlns:r="http://schemas.openxmlformats.org/officeDocument/2006/relationships" xmlns:p="http://schemas.openxmlformats.org/presentationml/2006/main">
+  <p:cSld>
+    <p:spTree>
+      <p:nvGrpSpPr>
+        <p:cNvPr id="1" name=""/>
+        <p:cNvGrpSpPr/>
+        <p:nvPr/>
+      </p:nvGrpSpPr>
+      <p:grpSpPr>
+        <a:xfrm>
+          <a:off x="0" y="0"/>
+          <a:ext cx="0" cy="0"/>
+          <a:chOff x="0" y="0"/>
+          <a:chExt cx="0" cy="0"/>
+        </a:xfrm>
+      </p:grpSpPr>
+      <p:sp>
+        <p:nvSpPr>
+          <p:cNvPr id="2" name="Title 1"/>
+          <p:cNvSpPr>
+            <a:spLocks noGrp="1"/>
+          </p:cNvSpPr>
+          <p:nvPr>
+            <p:ph type="title"/>
+          </p:nvPr>
+        </p:nvSpPr>
+        <p:spPr/>
+        <p:txBody>
+          <a:bodyPr/>
+          <a:lstStyle/>
+          <a:p>
+            <a:r>
+              <a:rPr lang="en-US" dirty="0" smtClean="0"/>
+              <a:t>Additional information on sex ratios</a:t>
+            </a:r>
+            <a:endParaRPr lang="en-US" dirty="0"/>
+          </a:p>
+        </p:txBody>
+      </p:sp>
+      <p:sp>
+        <p:nvSpPr>
+          <p:cNvPr id="3" name="Content Placeholder 2"/>
+          <p:cNvSpPr>
+            <a:spLocks noGrp="1"/>
+          </p:cNvSpPr>
+          <p:nvPr>
+            <p:ph idx="1"/>
+          </p:nvPr>
+        </p:nvSpPr>
+        <p:spPr/>
+        <p:txBody>
+          <a:bodyPr/>
+          <a:lstStyle/>
+          <a:p>
+            <a:r>
+              <a:rPr lang="en-US" dirty="0">
+                <a:hlinkClick r:id="rId2"/>
+              </a:rPr>
+              <a:t>https://</a:t>
+            </a:r>
+            <a:r>
+              <a:rPr lang="en-US" dirty="0" smtClean="0">
+                <a:hlinkClick r:id="rId2"/>
+              </a:rPr>
+              <a:t>www.pnas.org/content/112/16/E2102</a:t>
+            </a:r>
+            <a:endParaRPr lang="en-US" dirty="0" smtClean="0"/>
+          </a:p>
+          <a:p>
+            <a:r>
+              <a:rPr lang="en-US" dirty="0">
+                <a:hlinkClick r:id="rId3"/>
+              </a:rPr>
+              <a:t>https://www.populationpyramid.net/united-states-of-america/2017</a:t>
+            </a:r>
+            <a:r>
+              <a:rPr lang="en-US" dirty="0" smtClean="0">
+                <a:hlinkClick r:id="rId3"/>
+              </a:rPr>
+              <a:t>/</a:t>
+            </a:r>
+            <a:endParaRPr lang="en-US" dirty="0" smtClean="0"/>
+          </a:p>
+          <a:p>
+            <a:r>
+              <a:rPr lang="en-US" dirty="0">
+                <a:hlinkClick r:id="rId4"/>
+              </a:rPr>
+              <a:t>http://</a:t>
+            </a:r>
+            <a:r>
+              <a:rPr lang="en-US" dirty="0" smtClean="0">
+                <a:hlinkClick r:id="rId4"/>
+              </a:rPr>
+              <a:t>science.sciencemag.org/content/297/5589/2008</a:t>
+            </a:r>
+            <a:endParaRPr lang="en-US" dirty="0" smtClean="0"/>
+          </a:p>
+          <a:p>
+            <a:endParaRPr lang="en-US" dirty="0"/>
+          </a:p>
+        </p:txBody>
+      </p:sp>
+    </p:spTree>
+    <p:extLst>
+      <p:ext uri="{BB962C8B-B14F-4D97-AF65-F5344CB8AC3E}">
+        <p14:creationId xmlns:p14="http://schemas.microsoft.com/office/powerpoint/2010/main" val="882710562"/>
+      </p:ext>
+    </p:extLst>
+  </p:cSld>
+  <p:clrMapOvr>
+    <a:masterClrMapping/>
+  </p:clrMapOvr>
+  <p:timing>
+    <p:tnLst>
+      <p:par>
+        <p:cTn id="1" dur="indefinite" restart="never" nodeType="tmRoot"/>
+      </p:par>
+    </p:tnLst>
+  </p:timing>
+</p:sld>
+</file>
+
+<file path=ppt/slides/slide15.xml><?xml version="1.0" encoding="utf-8"?>
+<p:sld xmlns:a="http://schemas.openxmlformats.org/drawingml/2006/main" xmlns:r="http://schemas.openxmlformats.org/officeDocument/2006/relationships" xmlns:p="http://schemas.openxmlformats.org/presentationml/2006/main">
+  <p:cSld>
+    <p:spTree>
+      <p:nvGrpSpPr>
+        <p:cNvPr id="1" name=""/>
+        <p:cNvGrpSpPr/>
+        <p:nvPr/>
+      </p:nvGrpSpPr>
+      <p:grpSpPr>
+        <a:xfrm>
+          <a:off x="0" y="0"/>
+          <a:ext cx="0" cy="0"/>
+          <a:chOff x="0" y="0"/>
+          <a:chExt cx="0" cy="0"/>
+        </a:xfrm>
+      </p:grpSpPr>
+      <p:sp>
+        <p:nvSpPr>
+          <p:cNvPr id="2" name="Title 1"/>
+          <p:cNvSpPr>
+            <a:spLocks noGrp="1"/>
+          </p:cNvSpPr>
+          <p:nvPr>
+            <p:ph type="title"/>
+          </p:nvPr>
+        </p:nvSpPr>
+        <p:spPr/>
+        <p:txBody>
+          <a:bodyPr/>
+          <a:lstStyle/>
+          <a:p>
+            <a:r>
+              <a:rPr lang="en-US" dirty="0" smtClean="0"/>
+              <a:t>Data Sources</a:t>
+            </a:r>
+            <a:endParaRPr lang="en-US" dirty="0"/>
+          </a:p>
+        </p:txBody>
+      </p:sp>
+      <p:sp>
+        <p:nvSpPr>
+          <p:cNvPr id="3" name="Content Placeholder 2"/>
+          <p:cNvSpPr>
+            <a:spLocks noGrp="1"/>
+          </p:cNvSpPr>
+          <p:nvPr>
+            <p:ph idx="1"/>
+          </p:nvPr>
+        </p:nvSpPr>
+        <p:spPr/>
+        <p:txBody>
+          <a:bodyPr/>
+          <a:lstStyle/>
+          <a:p>
+            <a:r>
+              <a:rPr lang="en-US" dirty="0" smtClean="0"/>
+              <a:t>American Fact Finder</a:t>
+            </a:r>
+          </a:p>
+          <a:p>
+            <a:pPr lvl="1"/>
+            <a:r>
+              <a:rPr lang="en-US" dirty="0">
+                <a:hlinkClick r:id="rId2"/>
+              </a:rPr>
+              <a:t>https://</a:t>
+            </a:r>
+            <a:r>
+              <a:rPr lang="en-US" dirty="0" smtClean="0">
+                <a:hlinkClick r:id="rId2"/>
+              </a:rPr>
+              <a:t>factfinder.census.gov/faces/nav/jsf/pages/index.xhtml</a:t>
+            </a:r>
+            <a:endParaRPr lang="en-US" dirty="0" smtClean="0"/>
+          </a:p>
+          <a:p>
+            <a:r>
+              <a:rPr lang="en-US" dirty="0" smtClean="0"/>
+              <a:t>Place geography</a:t>
+            </a:r>
+          </a:p>
+          <a:p>
+            <a:pPr lvl="1"/>
+            <a:r>
+              <a:rPr lang="en-US" dirty="0">
+                <a:hlinkClick r:id="rId3"/>
+              </a:rPr>
+              <a:t>https://</a:t>
+            </a:r>
+            <a:r>
+              <a:rPr lang="en-US" dirty="0" smtClean="0">
+                <a:hlinkClick r:id="rId3"/>
+              </a:rPr>
+              <a:t>www.census.gov/geo/maps-data/data/tiger.html</a:t>
+            </a:r>
+            <a:endParaRPr lang="en-US" dirty="0" smtClean="0"/>
+          </a:p>
+          <a:p>
+            <a:endParaRPr lang="en-US" dirty="0"/>
+          </a:p>
+        </p:txBody>
+      </p:sp>
+    </p:spTree>
+    <p:extLst>
+      <p:ext uri="{BB962C8B-B14F-4D97-AF65-F5344CB8AC3E}">
+        <p14:creationId xmlns:p14="http://schemas.microsoft.com/office/powerpoint/2010/main" val="2983128838"/>
+      </p:ext>
+    </p:extLst>
+  </p:cSld>
+  <p:clrMapOvr>
+    <a:masterClrMapping/>
+  </p:clrMapOvr>
+  <p:timing>
+    <p:tnLst>
+      <p:par>
+        <p:cTn id="1" dur="indefinite" restart="never" nodeType="tmRoot"/>
+      </p:par>
+    </p:tnLst>
+  </p:timing>
+</p:sld>
+</file>
+
+<file path=ppt/slides/slide2.xml><?xml version="1.0" encoding="utf-8"?>
+<p:sld xmlns:a="http://schemas.openxmlformats.org/drawingml/2006/main" xmlns:r="http://schemas.openxmlformats.org/officeDocument/2006/relationships" xmlns:p="http://schemas.openxmlformats.org/presentationml/2006/main">
+  <p:cSld>
+    <p:spTree>
+      <p:nvGrpSpPr>
+        <p:cNvPr id="1" name=""/>
+        <p:cNvGrpSpPr/>
+        <p:nvPr/>
+      </p:nvGrpSpPr>
+      <p:grpSpPr>
+        <a:xfrm>
+          <a:off x="0" y="0"/>
+          <a:ext cx="0" cy="0"/>
+          <a:chOff x="0" y="0"/>
+          <a:chExt cx="0" cy="0"/>
+        </a:xfrm>
+      </p:grpSpPr>
+      <p:sp>
+        <p:nvSpPr>
+          <p:cNvPr id="2" name="Title 1"/>
+          <p:cNvSpPr>
+            <a:spLocks noGrp="1"/>
+          </p:cNvSpPr>
+          <p:nvPr>
+            <p:ph type="title"/>
+          </p:nvPr>
+        </p:nvSpPr>
+        <p:spPr/>
+        <p:txBody>
+          <a:bodyPr>
+            <a:normAutofit/>
+          </a:bodyPr>
+          <a:lstStyle/>
+          <a:p>
+            <a:r>
+              <a:rPr lang="en-US" sz="4000" dirty="0" smtClean="0"/>
+              <a:t>Location of this tutorial and </a:t>
+            </a:r>
+            <a:r>
+              <a:rPr lang="en-US" sz="4000" dirty="0" smtClean="0"/>
+              <a:t> </a:t>
+            </a:r>
+            <a:r>
+              <a:rPr lang="en-US" sz="4000" dirty="0" smtClean="0"/>
+              <a:t>workshop </a:t>
+            </a:r>
+            <a:r>
+              <a:rPr lang="en-US" sz="4000" dirty="0" smtClean="0"/>
+              <a:t>material</a:t>
+            </a:r>
+            <a:endParaRPr lang="en-US" sz="4000" dirty="0"/>
+          </a:p>
+        </p:txBody>
+      </p:sp>
+      <p:sp>
+        <p:nvSpPr>
+          <p:cNvPr id="3" name="Content Placeholder 2"/>
+          <p:cNvSpPr>
+            <a:spLocks noGrp="1"/>
+          </p:cNvSpPr>
+          <p:nvPr>
+            <p:ph idx="1"/>
+          </p:nvPr>
+        </p:nvSpPr>
+        <p:spPr>
+          <a:xfrm>
+            <a:off x="838200" y="1834769"/>
+            <a:ext cx="10515600" cy="4351338"/>
+          </a:xfrm>
+        </p:spPr>
+        <p:txBody>
+          <a:bodyPr>
+            <a:normAutofit/>
+          </a:bodyPr>
+          <a:lstStyle/>
+          <a:p>
+            <a:r>
+              <a:rPr lang="en-US" sz="4000" dirty="0"/>
+              <a:t>https://github.com/mike-babb/intro_to_python</a:t>
+            </a:r>
+            <a:endParaRPr lang="en-US" sz="4000" dirty="0"/>
+          </a:p>
+        </p:txBody>
+      </p:sp>
+    </p:spTree>
+    <p:extLst>
+      <p:ext uri="{BB962C8B-B14F-4D97-AF65-F5344CB8AC3E}">
+        <p14:creationId xmlns:p14="http://schemas.microsoft.com/office/powerpoint/2010/main" val="1328163784"/>
+      </p:ext>
+    </p:extLst>
+  </p:cSld>
+  <p:clrMapOvr>
+    <a:masterClrMapping/>
+  </p:clrMapOvr>
+  <p:timing>
+    <p:tnLst>
+      <p:par>
+        <p:cTn id="1" dur="indefinite" restart="never" nodeType="tmRoot"/>
+      </p:par>
+    </p:tnLst>
+  </p:timing>
+</p:sld>
+</file>
+
+<file path=ppt/slides/slide3.xml><?xml version="1.0" encoding="utf-8"?>
+<p:sld xmlns:a="http://schemas.openxmlformats.org/drawingml/2006/main" xmlns:r="http://schemas.openxmlformats.org/officeDocument/2006/relationships" xmlns:p="http://schemas.openxmlformats.org/presentationml/2006/main">
+  <p:cSld>
+    <p:spTree>
+      <p:nvGrpSpPr>
+        <p:cNvPr id="1" name=""/>
+        <p:cNvGrpSpPr/>
+        <p:nvPr/>
+      </p:nvGrpSpPr>
+      <p:grpSpPr>
+        <a:xfrm>
+          <a:off x="0" y="0"/>
+          <a:ext cx="0" cy="0"/>
+          <a:chOff x="0" y="0"/>
+          <a:chExt cx="0" cy="0"/>
+        </a:xfrm>
+      </p:grpSpPr>
+      <p:sp>
+        <p:nvSpPr>
+          <p:cNvPr id="2" name="Title 1"/>
+          <p:cNvSpPr>
+            <a:spLocks noGrp="1"/>
+          </p:cNvSpPr>
+          <p:nvPr>
+            <p:ph type="title"/>
+          </p:nvPr>
+        </p:nvSpPr>
+        <p:spPr/>
+        <p:txBody>
+          <a:bodyPr/>
+          <a:lstStyle/>
+          <a:p>
+            <a:r>
+              <a:rPr lang="en-US" dirty="0" smtClean="0"/>
+              <a:t>Activities</a:t>
+            </a:r>
+            <a:endParaRPr lang="en-US" dirty="0"/>
+          </a:p>
+        </p:txBody>
+      </p:sp>
+      <p:sp>
+        <p:nvSpPr>
+          <p:cNvPr id="3" name="Content Placeholder 2"/>
+          <p:cNvSpPr>
+            <a:spLocks noGrp="1"/>
+          </p:cNvSpPr>
+          <p:nvPr>
+            <p:ph idx="1"/>
+          </p:nvPr>
+        </p:nvSpPr>
+        <p:spPr/>
+        <p:txBody>
+          <a:bodyPr/>
+          <a:lstStyle/>
+          <a:p>
+            <a:r>
+              <a:rPr lang="en-US" dirty="0" smtClean="0"/>
+              <a:t>Examine basic python syntax</a:t>
+            </a:r>
+          </a:p>
+          <a:p>
+            <a:r>
+              <a:rPr lang="en-US" dirty="0" smtClean="0"/>
+              <a:t>Using pandas, we will read in data pertaining to the age and sex of the population of Census Designated Places in Washington State during the 2013-2017 time </a:t>
+            </a:r>
+            <a:r>
+              <a:rPr lang="en-US" dirty="0" smtClean="0"/>
+              <a:t>period</a:t>
+            </a:r>
+            <a:endParaRPr lang="en-US" dirty="0" smtClean="0"/>
+          </a:p>
+          <a:p>
+            <a:r>
+              <a:rPr lang="en-US" dirty="0" smtClean="0"/>
+              <a:t>Compute the </a:t>
+            </a:r>
+            <a:r>
+              <a:rPr lang="en-US" dirty="0" smtClean="0"/>
+              <a:t>all ages </a:t>
+            </a:r>
+            <a:r>
+              <a:rPr lang="en-US" dirty="0" smtClean="0"/>
+              <a:t>sex-ratio</a:t>
+            </a:r>
+          </a:p>
+          <a:p>
+            <a:r>
+              <a:rPr lang="en-US" dirty="0" smtClean="0"/>
+              <a:t>Export the data to a .csv and an Excel workbook</a:t>
+            </a:r>
+            <a:endParaRPr lang="en-US" dirty="0"/>
+          </a:p>
+        </p:txBody>
+      </p:sp>
+    </p:spTree>
+    <p:extLst>
+      <p:ext uri="{BB962C8B-B14F-4D97-AF65-F5344CB8AC3E}">
+        <p14:creationId xmlns:p14="http://schemas.microsoft.com/office/powerpoint/2010/main" val="3030563835"/>
+      </p:ext>
+    </p:extLst>
+  </p:cSld>
+  <p:clrMapOvr>
+    <a:masterClrMapping/>
+  </p:clrMapOvr>
+  <p:timing>
+    <p:tnLst>
+      <p:par>
+        <p:cTn id="1" dur="indefinite" restart="never" nodeType="tmRoot"/>
+      </p:par>
+    </p:tnLst>
+  </p:timing>
+</p:sld>
+</file>
+
+<file path=ppt/slides/slide4.xml><?xml version="1.0" encoding="utf-8"?>
+<p:sld xmlns:a="http://schemas.openxmlformats.org/drawingml/2006/main" xmlns:r="http://schemas.openxmlformats.org/officeDocument/2006/relationships" xmlns:p="http://schemas.openxmlformats.org/presentationml/2006/main">
+  <p:cSld>
+    <p:spTree>
+      <p:nvGrpSpPr>
+        <p:cNvPr id="1" name=""/>
+        <p:cNvGrpSpPr/>
+        <p:nvPr/>
+      </p:nvGrpSpPr>
+      <p:grpSpPr>
+        <a:xfrm>
+          <a:off x="0" y="0"/>
+          <a:ext cx="0" cy="0"/>
+          <a:chOff x="0" y="0"/>
+          <a:chExt cx="0" cy="0"/>
+        </a:xfrm>
+      </p:grpSpPr>
+      <p:sp>
+        <p:nvSpPr>
+          <p:cNvPr id="2" name="Title 1"/>
+          <p:cNvSpPr>
+            <a:spLocks noGrp="1"/>
+          </p:cNvSpPr>
+          <p:nvPr>
+            <p:ph type="title"/>
+          </p:nvPr>
+        </p:nvSpPr>
+        <p:spPr/>
+        <p:txBody>
+          <a:bodyPr/>
+          <a:lstStyle/>
+          <a:p>
+            <a:r>
+              <a:rPr lang="en-US" dirty="0" smtClean="0"/>
+              <a:t>The Data</a:t>
+            </a:r>
+            <a:endParaRPr lang="en-US" dirty="0"/>
+          </a:p>
+        </p:txBody>
+      </p:sp>
+      <p:sp>
+        <p:nvSpPr>
+          <p:cNvPr id="3" name="Content Placeholder 2"/>
+          <p:cNvSpPr>
+            <a:spLocks noGrp="1"/>
+          </p:cNvSpPr>
+          <p:nvPr>
+            <p:ph idx="1"/>
+          </p:nvPr>
+        </p:nvSpPr>
+        <p:spPr/>
+        <p:txBody>
+          <a:bodyPr/>
+          <a:lstStyle/>
+          <a:p>
+            <a:r>
+              <a:rPr lang="en-US" dirty="0" smtClean="0"/>
+              <a:t>American Community Survey, 2013 – 2017</a:t>
+            </a:r>
+          </a:p>
+          <a:p>
+            <a:r>
+              <a:rPr lang="en-US" dirty="0" smtClean="0"/>
+              <a:t>We’ll be </a:t>
+            </a:r>
+            <a:r>
+              <a:rPr lang="en-US" dirty="0" smtClean="0"/>
+              <a:t>investigating the all ages sex ratio for places in Washington State</a:t>
+            </a:r>
+          </a:p>
+          <a:p>
+            <a:r>
+              <a:rPr lang="en-US" dirty="0" smtClean="0"/>
+              <a:t>All Ages Sex Ratio: The number of Males per 100 Females. </a:t>
+            </a:r>
+            <a:endParaRPr lang="en-US" dirty="0"/>
+          </a:p>
+        </p:txBody>
+      </p:sp>
+    </p:spTree>
+    <p:extLst>
+      <p:ext uri="{BB962C8B-B14F-4D97-AF65-F5344CB8AC3E}">
+        <p14:creationId xmlns:p14="http://schemas.microsoft.com/office/powerpoint/2010/main" val="757023306"/>
+      </p:ext>
+    </p:extLst>
+  </p:cSld>
+  <p:clrMapOvr>
+    <a:masterClrMapping/>
+  </p:clrMapOvr>
+  <p:timing>
+    <p:tnLst>
+      <p:par>
+        <p:cTn id="1" dur="indefinite" restart="never" nodeType="tmRoot"/>
+      </p:par>
+    </p:tnLst>
+  </p:timing>
+</p:sld>
+</file>
+
+<file path=ppt/slides/slide5.xml><?xml version="1.0" encoding="utf-8"?>
+<p:sld xmlns:a="http://schemas.openxmlformats.org/drawingml/2006/main" xmlns:r="http://schemas.openxmlformats.org/officeDocument/2006/relationships" xmlns:p="http://schemas.openxmlformats.org/presentationml/2006/main">
+  <p:cSld>
+    <p:spTree>
+      <p:nvGrpSpPr>
+        <p:cNvPr id="1" name=""/>
+        <p:cNvGrpSpPr/>
+        <p:nvPr/>
+      </p:nvGrpSpPr>
+      <p:grpSpPr>
+        <a:xfrm>
+          <a:off x="0" y="0"/>
+          <a:ext cx="0" cy="0"/>
+          <a:chOff x="0" y="0"/>
+          <a:chExt cx="0" cy="0"/>
+        </a:xfrm>
+      </p:grpSpPr>
+      <p:sp>
+        <p:nvSpPr>
+          <p:cNvPr id="2" name="Title 1"/>
+          <p:cNvSpPr>
+            <a:spLocks noGrp="1"/>
+          </p:cNvSpPr>
+          <p:nvPr>
+            <p:ph type="title"/>
+          </p:nvPr>
+        </p:nvSpPr>
+        <p:spPr/>
+        <p:txBody>
+          <a:bodyPr/>
+          <a:lstStyle/>
+          <a:p>
+            <a:r>
+              <a:rPr lang="en-US" dirty="0" smtClean="0"/>
+              <a:t>Why python?</a:t>
+            </a:r>
+            <a:endParaRPr lang="en-US" dirty="0"/>
+          </a:p>
+        </p:txBody>
+      </p:sp>
+      <p:sp>
+        <p:nvSpPr>
+          <p:cNvPr id="3" name="Content Placeholder 2"/>
+          <p:cNvSpPr>
+            <a:spLocks noGrp="1"/>
+          </p:cNvSpPr>
+          <p:nvPr>
+            <p:ph idx="1"/>
+          </p:nvPr>
+        </p:nvSpPr>
+        <p:spPr/>
+        <p:txBody>
+          <a:bodyPr>
+            <a:normAutofit fontScale="92500" lnSpcReduction="20000"/>
+          </a:bodyPr>
+          <a:lstStyle/>
+          <a:p>
+            <a:pPr>
+              <a:buFont typeface="Arial" panose="020B0604020202020204" pitchFamily="34" charset="0"/>
+              <a:buChar char="•"/>
+            </a:pPr>
+            <a:r>
+              <a:rPr lang="en-US" dirty="0" smtClean="0"/>
+              <a:t>It’s easy to jump in: </a:t>
+            </a:r>
+            <a:r>
+              <a:rPr lang="en-US" dirty="0" smtClean="0">
+                <a:hlinkClick r:id="rId2"/>
+              </a:rPr>
+              <a:t>https</a:t>
+            </a:r>
+            <a:r>
+              <a:rPr lang="en-US" dirty="0">
+                <a:hlinkClick r:id="rId2"/>
+              </a:rPr>
+              <a:t>://www.python.org/about/gettingstarted</a:t>
+            </a:r>
+            <a:r>
+              <a:rPr lang="en-US" dirty="0" smtClean="0">
+                <a:hlinkClick r:id="rId2"/>
+              </a:rPr>
+              <a:t>/</a:t>
+            </a:r>
+            <a:endParaRPr lang="en-US" dirty="0" smtClean="0"/>
+          </a:p>
+          <a:p>
+            <a:pPr>
+              <a:buFont typeface="Arial" panose="020B0604020202020204" pitchFamily="34" charset="0"/>
+              <a:buChar char="•"/>
+            </a:pPr>
+            <a:r>
+              <a:rPr lang="en-US" dirty="0" smtClean="0"/>
+              <a:t>It’s cross-platform: Windows, Mac, Linux</a:t>
+            </a:r>
+          </a:p>
+          <a:p>
+            <a:pPr>
+              <a:buFont typeface="Arial" panose="020B0604020202020204" pitchFamily="34" charset="0"/>
+              <a:buChar char="•"/>
+            </a:pPr>
+            <a:r>
+              <a:rPr lang="en-US" dirty="0" smtClean="0"/>
+              <a:t>It was designed to be simple and readable: </a:t>
+            </a:r>
+            <a:r>
+              <a:rPr lang="en-US" dirty="0" smtClean="0">
+                <a:hlinkClick r:id="rId3"/>
+              </a:rPr>
+              <a:t>https</a:t>
+            </a:r>
+            <a:r>
+              <a:rPr lang="en-US" dirty="0">
+                <a:hlinkClick r:id="rId3"/>
+              </a:rPr>
+              <a:t>://xkcd.com/353</a:t>
+            </a:r>
+            <a:r>
+              <a:rPr lang="en-US" dirty="0" smtClean="0">
+                <a:hlinkClick r:id="rId3"/>
+              </a:rPr>
+              <a:t>/</a:t>
+            </a:r>
+            <a:endParaRPr lang="en-US" dirty="0" smtClean="0"/>
+          </a:p>
+          <a:p>
+            <a:r>
+              <a:rPr lang="en-US" dirty="0"/>
+              <a:t>It’s free</a:t>
+            </a:r>
+            <a:r>
+              <a:rPr lang="en-US" dirty="0" smtClean="0"/>
+              <a:t>!</a:t>
+            </a:r>
+          </a:p>
+          <a:p>
+            <a:r>
+              <a:rPr lang="en-US" dirty="0" smtClean="0"/>
+              <a:t>It’s popular: </a:t>
+            </a:r>
+            <a:r>
+              <a:rPr lang="en-US" dirty="0" smtClean="0">
+                <a:hlinkClick r:id="rId4"/>
+              </a:rPr>
+              <a:t>https</a:t>
+            </a:r>
+            <a:r>
+              <a:rPr lang="en-US" dirty="0">
+                <a:hlinkClick r:id="rId4"/>
+              </a:rPr>
+              <a:t>://www.tiobe.com/tiobe-index/python</a:t>
+            </a:r>
+            <a:r>
+              <a:rPr lang="en-US" dirty="0" smtClean="0">
+                <a:hlinkClick r:id="rId4"/>
+              </a:rPr>
+              <a:t>/</a:t>
+            </a:r>
+            <a:endParaRPr lang="en-US" dirty="0" smtClean="0"/>
+          </a:p>
+          <a:p>
+            <a:pPr>
+              <a:buFont typeface="Arial" panose="020B0604020202020204" pitchFamily="34" charset="0"/>
+              <a:buChar char="•"/>
+            </a:pPr>
+            <a:r>
+              <a:rPr lang="en-US" dirty="0" smtClean="0"/>
+              <a:t>It’s prolific: used in many industries for many jobs. Finance, real estate tech, server administration, health care research, non-profit administration</a:t>
+            </a:r>
+          </a:p>
+          <a:p>
+            <a:pPr>
+              <a:buFont typeface="Arial" panose="020B0604020202020204" pitchFamily="34" charset="0"/>
+              <a:buChar char="•"/>
+            </a:pPr>
+            <a:r>
+              <a:rPr lang="en-US" dirty="0" smtClean="0"/>
+              <a:t>And departments across campus: sociology, economics, civil engineering, astronomy (and geography!)</a:t>
+            </a:r>
+          </a:p>
+          <a:p>
+            <a:pPr>
+              <a:buFont typeface="Arial" panose="020B0604020202020204" pitchFamily="34" charset="0"/>
+              <a:buChar char="•"/>
+            </a:pPr>
+            <a:r>
+              <a:rPr lang="en-US" dirty="0" smtClean="0"/>
+              <a:t>Many libraries that do pretty much what you want with just a few commands</a:t>
+            </a:r>
+          </a:p>
+          <a:p>
+            <a:pPr>
+              <a:buFont typeface="Arial" panose="020B0604020202020204" pitchFamily="34" charset="0"/>
+              <a:buChar char="•"/>
+            </a:pPr>
+            <a:endParaRPr lang="en-US" dirty="0"/>
+          </a:p>
+        </p:txBody>
+      </p:sp>
+    </p:spTree>
+    <p:extLst>
+      <p:ext uri="{BB962C8B-B14F-4D97-AF65-F5344CB8AC3E}">
+        <p14:creationId xmlns:p14="http://schemas.microsoft.com/office/powerpoint/2010/main" val="3321498620"/>
+      </p:ext>
+    </p:extLst>
+  </p:cSld>
+  <p:clrMapOvr>
+    <a:masterClrMapping/>
+  </p:clrMapOvr>
+  <p:timing>
+    <p:tnLst>
+      <p:par>
+        <p:cTn id="1" dur="indefinite" restart="never" nodeType="tmRoot"/>
+      </p:par>
+    </p:tnLst>
+  </p:timing>
+</p:sld>
+</file>
+
+<file path=ppt/slides/slide6.xml><?xml version="1.0" encoding="utf-8"?>
+<p:sld xmlns:a="http://schemas.openxmlformats.org/drawingml/2006/main" xmlns:r="http://schemas.openxmlformats.org/officeDocument/2006/relationships" xmlns:p="http://schemas.openxmlformats.org/presentationml/2006/main">
+  <p:cSld>
+    <p:spTree>
+      <p:nvGrpSpPr>
+        <p:cNvPr id="1" name=""/>
+        <p:cNvGrpSpPr/>
+        <p:nvPr/>
+      </p:nvGrpSpPr>
+      <p:grpSpPr>
+        <a:xfrm>
+          <a:off x="0" y="0"/>
+          <a:ext cx="0" cy="0"/>
+          <a:chOff x="0" y="0"/>
+          <a:chExt cx="0" cy="0"/>
+        </a:xfrm>
+      </p:grpSpPr>
+      <p:sp>
+        <p:nvSpPr>
+          <p:cNvPr id="2" name="Title 1"/>
+          <p:cNvSpPr>
+            <a:spLocks noGrp="1"/>
+          </p:cNvSpPr>
+          <p:nvPr>
+            <p:ph type="title"/>
+          </p:nvPr>
+        </p:nvSpPr>
+        <p:spPr/>
+        <p:txBody>
+          <a:bodyPr/>
+          <a:lstStyle/>
+          <a:p>
+            <a:r>
+              <a:rPr lang="en-US" dirty="0" smtClean="0"/>
+              <a:t>Brief </a:t>
+            </a:r>
+            <a:r>
+              <a:rPr lang="en-US" dirty="0" smtClean="0"/>
+              <a:t>history about Python</a:t>
+            </a:r>
+            <a:endParaRPr lang="en-US" dirty="0"/>
+          </a:p>
+        </p:txBody>
+      </p:sp>
+      <p:sp>
+        <p:nvSpPr>
+          <p:cNvPr id="3" name="Content Placeholder 2"/>
+          <p:cNvSpPr>
+            <a:spLocks noGrp="1"/>
+          </p:cNvSpPr>
+          <p:nvPr>
+            <p:ph idx="1"/>
+          </p:nvPr>
+        </p:nvSpPr>
+        <p:spPr/>
+        <p:txBody>
+          <a:bodyPr/>
+          <a:lstStyle/>
+          <a:p>
+            <a:r>
+              <a:rPr lang="en-US" dirty="0" smtClean="0"/>
+              <a:t>Developed by Guido van Rossum in the early 90s. Current versions</a:t>
+            </a:r>
+            <a:r>
+              <a:rPr lang="en-US" dirty="0"/>
+              <a:t>: Python </a:t>
+            </a:r>
+            <a:r>
+              <a:rPr lang="en-US" dirty="0" smtClean="0"/>
+              <a:t>3.7.2 </a:t>
+            </a:r>
+            <a:r>
+              <a:rPr lang="en-US" dirty="0"/>
+              <a:t>and Python </a:t>
+            </a:r>
+            <a:r>
+              <a:rPr lang="en-US" dirty="0" smtClean="0"/>
+              <a:t>2.7.15</a:t>
+            </a:r>
+          </a:p>
+          <a:p>
+            <a:r>
+              <a:rPr lang="en-US" dirty="0" smtClean="0"/>
+              <a:t>Python 3.7 is van Rossum’s (and the larger community’s) attempt at fixing some core issues with python 2.x</a:t>
+            </a:r>
+          </a:p>
+          <a:p>
+            <a:pPr lvl="1"/>
+            <a:r>
+              <a:rPr lang="en-US" dirty="0" smtClean="0"/>
+              <a:t>Integer division returns floats (5 / 2 = 2.5 instead of 5/2 = 2)</a:t>
+            </a:r>
+          </a:p>
+          <a:p>
+            <a:pPr lvl="1"/>
+            <a:r>
+              <a:rPr lang="en-US" dirty="0" smtClean="0"/>
+              <a:t>Better handling of strings</a:t>
+            </a:r>
+          </a:p>
+          <a:p>
+            <a:pPr lvl="1"/>
+            <a:r>
+              <a:rPr lang="en-US" dirty="0" smtClean="0"/>
+              <a:t>Better memory management in some cases</a:t>
+            </a:r>
+          </a:p>
+          <a:p>
+            <a:pPr lvl="1"/>
+            <a:r>
+              <a:rPr lang="en-US" dirty="0" smtClean="0"/>
+              <a:t>It’s </a:t>
+            </a:r>
+            <a:r>
+              <a:rPr lang="en-US" dirty="0"/>
+              <a:t>a bit faster in general: </a:t>
+            </a:r>
+            <a:r>
+              <a:rPr lang="en-US" dirty="0">
+                <a:hlinkClick r:id="rId2"/>
+              </a:rPr>
+              <a:t>https://</a:t>
+            </a:r>
+            <a:r>
+              <a:rPr lang="en-US" dirty="0" smtClean="0">
+                <a:hlinkClick r:id="rId2"/>
+              </a:rPr>
+              <a:t>hackernoon.com/which-is-the-fastest-version-of-python-2ae7c61a6b2b</a:t>
+            </a:r>
+            <a:endParaRPr lang="en-US" dirty="0" smtClean="0"/>
+          </a:p>
+          <a:p>
+            <a:pPr marL="457200" lvl="1" indent="0">
+              <a:buNone/>
+            </a:pPr>
+            <a:endParaRPr lang="en-US" dirty="0" smtClean="0"/>
+          </a:p>
+        </p:txBody>
+      </p:sp>
+    </p:spTree>
+    <p:extLst>
+      <p:ext uri="{BB962C8B-B14F-4D97-AF65-F5344CB8AC3E}">
+        <p14:creationId xmlns:p14="http://schemas.microsoft.com/office/powerpoint/2010/main" val="3428809214"/>
+      </p:ext>
+    </p:extLst>
+  </p:cSld>
+  <p:clrMapOvr>
+    <a:masterClrMapping/>
+  </p:clrMapOvr>
+  <p:timing>
+    <p:tnLst>
+      <p:par>
+        <p:cTn id="1" dur="indefinite" restart="never" nodeType="tmRoot"/>
+      </p:par>
+    </p:tnLst>
+  </p:timing>
+</p:sld>
+</file>
+
+<file path=ppt/slides/slide7.xml><?xml version="1.0" encoding="utf-8"?>
+<p:sld xmlns:a="http://schemas.openxmlformats.org/drawingml/2006/main" xmlns:r="http://schemas.openxmlformats.org/officeDocument/2006/relationships" xmlns:p="http://schemas.openxmlformats.org/presentationml/2006/main">
+  <p:cSld>
+    <p:spTree>
+      <p:nvGrpSpPr>
+        <p:cNvPr id="1" name=""/>
+        <p:cNvGrpSpPr/>
+        <p:nvPr/>
+      </p:nvGrpSpPr>
+      <p:grpSpPr>
+        <a:xfrm>
+          <a:off x="0" y="0"/>
+          <a:ext cx="0" cy="0"/>
+          <a:chOff x="0" y="0"/>
+          <a:chExt cx="0" cy="0"/>
+        </a:xfrm>
+      </p:grpSpPr>
+      <p:sp>
+        <p:nvSpPr>
+          <p:cNvPr id="2" name="Title 1"/>
+          <p:cNvSpPr>
+            <a:spLocks noGrp="1"/>
+          </p:cNvSpPr>
+          <p:nvPr>
+            <p:ph type="title"/>
+          </p:nvPr>
+        </p:nvSpPr>
+        <p:spPr/>
+        <p:txBody>
+          <a:bodyPr/>
+          <a:lstStyle/>
+          <a:p>
+            <a:r>
+              <a:rPr lang="en-US" dirty="0" smtClean="0"/>
+              <a:t>Pandas – Python Data Analysis Library</a:t>
+            </a:r>
+            <a:endParaRPr lang="en-US" dirty="0"/>
+          </a:p>
+        </p:txBody>
+      </p:sp>
+      <p:pic>
+        <p:nvPicPr>
+          <p:cNvPr id="3" name="Picture 2"/>
+          <p:cNvPicPr>
+            <a:picLocks noChangeAspect="1"/>
+          </p:cNvPicPr>
+          <p:nvPr/>
+        </p:nvPicPr>
+        <p:blipFill rotWithShape="1">
+          <a:blip r:embed="rId2"/>
+          <a:srcRect l="3548"/>
+          <a:stretch/>
+        </p:blipFill>
+        <p:spPr>
+          <a:xfrm>
+            <a:off x="923544" y="1591056"/>
+            <a:ext cx="7291922" cy="4806505"/>
+          </a:xfrm>
+          <a:prstGeom prst="rect">
+            <a:avLst/>
+          </a:prstGeom>
+        </p:spPr>
+      </p:pic>
+      <p:sp>
+        <p:nvSpPr>
+          <p:cNvPr id="4" name="TextBox 3"/>
+          <p:cNvSpPr txBox="1"/>
+          <p:nvPr/>
+        </p:nvSpPr>
+        <p:spPr>
+          <a:xfrm>
+            <a:off x="8300810" y="1591056"/>
+            <a:ext cx="3447288" cy="369332"/>
+          </a:xfrm>
+          <a:prstGeom prst="rect">
+            <a:avLst/>
+          </a:prstGeom>
+          <a:noFill/>
+        </p:spPr>
+        <p:txBody>
+          <a:bodyPr wrap="square" rtlCol="0">
+            <a:spAutoFit/>
+          </a:bodyPr>
+          <a:lstStyle/>
+          <a:p>
+            <a:r>
+              <a:rPr lang="en-US" dirty="0">
+                <a:hlinkClick r:id="rId3"/>
+              </a:rPr>
+              <a:t>https://pandas.pydata.org</a:t>
+            </a:r>
+            <a:r>
+              <a:rPr lang="en-US" dirty="0" smtClean="0">
+                <a:hlinkClick r:id="rId3"/>
+              </a:rPr>
+              <a:t>/</a:t>
+            </a:r>
+            <a:r>
+              <a:rPr lang="en-US" dirty="0" smtClean="0"/>
+              <a:t> </a:t>
+            </a:r>
+            <a:endParaRPr lang="en-US" dirty="0"/>
+          </a:p>
+        </p:txBody>
+      </p:sp>
+    </p:spTree>
+    <p:extLst>
+      <p:ext uri="{BB962C8B-B14F-4D97-AF65-F5344CB8AC3E}">
+        <p14:creationId xmlns:p14="http://schemas.microsoft.com/office/powerpoint/2010/main" val="2298993283"/>
+      </p:ext>
+    </p:extLst>
+  </p:cSld>
+  <p:clrMapOvr>
+    <a:masterClrMapping/>
+  </p:clrMapOvr>
+  <p:timing>
+    <p:tnLst>
+      <p:par>
+        <p:cTn id="1" dur="indefinite" restart="never" nodeType="tmRoot"/>
+      </p:par>
+    </p:tnLst>
+  </p:timing>
+</p:sld>
+</file>
+
+<file path=ppt/slides/slide8.xml><?xml version="1.0" encoding="utf-8"?>
+<p:sld xmlns:a="http://schemas.openxmlformats.org/drawingml/2006/main" xmlns:r="http://schemas.openxmlformats.org/officeDocument/2006/relationships" xmlns:p="http://schemas.openxmlformats.org/presentationml/2006/main">
+  <p:cSld>
+    <p:spTree>
+      <p:nvGrpSpPr>
+        <p:cNvPr id="1" name=""/>
+        <p:cNvGrpSpPr/>
+        <p:nvPr/>
+      </p:nvGrpSpPr>
+      <p:grpSpPr>
+        <a:xfrm>
+          <a:off x="0" y="0"/>
+          <a:ext cx="0" cy="0"/>
+          <a:chOff x="0" y="0"/>
+          <a:chExt cx="0" cy="0"/>
+        </a:xfrm>
+      </p:grpSpPr>
+      <p:sp>
+        <p:nvSpPr>
+          <p:cNvPr id="2" name="Title 1"/>
+          <p:cNvSpPr>
+            <a:spLocks noGrp="1"/>
+          </p:cNvSpPr>
+          <p:nvPr>
+            <p:ph type="title"/>
+          </p:nvPr>
+        </p:nvSpPr>
+        <p:spPr/>
+        <p:txBody>
+          <a:bodyPr/>
+          <a:lstStyle/>
+          <a:p>
+            <a:r>
+              <a:rPr lang="en-US" dirty="0" smtClean="0"/>
+              <a:t>Anaconda and the Jupyter Notebook</a:t>
+            </a:r>
+            <a:endParaRPr lang="en-US" dirty="0"/>
+          </a:p>
+        </p:txBody>
+      </p:sp>
+      <p:sp>
+        <p:nvSpPr>
+          <p:cNvPr id="3" name="Content Placeholder 2"/>
+          <p:cNvSpPr>
+            <a:spLocks noGrp="1"/>
+          </p:cNvSpPr>
+          <p:nvPr>
+            <p:ph idx="1"/>
+          </p:nvPr>
+        </p:nvSpPr>
+        <p:spPr/>
+        <p:txBody>
+          <a:bodyPr/>
+          <a:lstStyle/>
+          <a:p>
+            <a:r>
+              <a:rPr lang="en-US" dirty="0">
+                <a:hlinkClick r:id="rId2"/>
+              </a:rPr>
+              <a:t>https://www.anaconda.com</a:t>
+            </a:r>
+            <a:r>
+              <a:rPr lang="en-US" dirty="0" smtClean="0">
+                <a:hlinkClick r:id="rId2"/>
+              </a:rPr>
+              <a:t>/</a:t>
+            </a:r>
+            <a:r>
+              <a:rPr lang="en-US" dirty="0" smtClean="0"/>
+              <a:t> </a:t>
+            </a:r>
+          </a:p>
+          <a:p>
+            <a:r>
+              <a:rPr lang="en-US" dirty="0" smtClean="0"/>
+              <a:t>Available for Mac, Linux, and Windows</a:t>
+            </a:r>
+          </a:p>
+          <a:p>
+            <a:r>
+              <a:rPr lang="en-US" dirty="0" smtClean="0"/>
+              <a:t>THE python data-science platform </a:t>
+            </a:r>
+          </a:p>
+          <a:p>
+            <a:r>
+              <a:rPr lang="en-US" dirty="0" smtClean="0"/>
+              <a:t>Facilitates interactive python</a:t>
+            </a:r>
+          </a:p>
+          <a:p>
+            <a:pPr>
+              <a:buFont typeface="Arial" panose="020B0604020202020204" pitchFamily="34" charset="0"/>
+              <a:buChar char="•"/>
+            </a:pPr>
+            <a:r>
+              <a:rPr lang="en-US" dirty="0" smtClean="0"/>
+              <a:t>Good for sharing and instruction</a:t>
+            </a:r>
+          </a:p>
+          <a:p>
+            <a:pPr>
+              <a:buFont typeface="Arial" panose="020B0604020202020204" pitchFamily="34" charset="0"/>
+              <a:buChar char="•"/>
+            </a:pPr>
+            <a:r>
+              <a:rPr lang="en-US" dirty="0" smtClean="0"/>
+              <a:t>Easy to break code into manageable chunks</a:t>
+            </a:r>
+          </a:p>
+          <a:p>
+            <a:pPr marL="0" indent="0">
+              <a:buNone/>
+            </a:pPr>
+            <a:endParaRPr lang="en-US" dirty="0" smtClean="0"/>
+          </a:p>
+        </p:txBody>
+      </p:sp>
+    </p:spTree>
+    <p:extLst>
+      <p:ext uri="{BB962C8B-B14F-4D97-AF65-F5344CB8AC3E}">
+        <p14:creationId xmlns:p14="http://schemas.microsoft.com/office/powerpoint/2010/main" val="3755854532"/>
+      </p:ext>
+    </p:extLst>
+  </p:cSld>
+  <p:clrMapOvr>
+    <a:masterClrMapping/>
+  </p:clrMapOvr>
+  <p:timing>
+    <p:tnLst>
+      <p:par>
+        <p:cTn id="1" dur="indefinite" restart="never" nodeType="tmRoot"/>
+      </p:par>
+    </p:tnLst>
+  </p:timing>
+</p:sld>
+</file>
+
+<file path=ppt/slides/slide9.xml><?xml version="1.0" encoding="utf-8"?>
+<p:sld xmlns:a="http://schemas.openxmlformats.org/drawingml/2006/main" xmlns:r="http://schemas.openxmlformats.org/officeDocument/2006/relationships" xmlns:p="http://schemas.openxmlformats.org/presentationml/2006/main">
+  <p:cSld>
+    <p:spTree>
+      <p:nvGrpSpPr>
+        <p:cNvPr id="1" name=""/>
+        <p:cNvGrpSpPr/>
+        <p:nvPr/>
+      </p:nvGrpSpPr>
+      <p:grpSpPr>
+        <a:xfrm>
+          <a:off x="0" y="0"/>
+          <a:ext cx="0" cy="0"/>
+          <a:chOff x="0" y="0"/>
+          <a:chExt cx="0" cy="0"/>
+        </a:xfrm>
+      </p:grpSpPr>
+      <p:sp>
+        <p:nvSpPr>
+          <p:cNvPr id="5" name="Title 4"/>
+          <p:cNvSpPr>
+            <a:spLocks noGrp="1"/>
+          </p:cNvSpPr>
+          <p:nvPr>
+            <p:ph type="title"/>
+          </p:nvPr>
+        </p:nvSpPr>
+        <p:spPr/>
+        <p:txBody>
+          <a:bodyPr/>
+          <a:lstStyle/>
+          <a:p>
+            <a:r>
+              <a:rPr lang="en-US" dirty="0" smtClean="0"/>
+              <a:t>Jupyter Notebook Homepage</a:t>
+            </a:r>
+            <a:endParaRPr lang="en-US" dirty="0"/>
+          </a:p>
+        </p:txBody>
+      </p:sp>
+      <p:pic>
+        <p:nvPicPr>
+          <p:cNvPr id="2" name="Picture 1"/>
+          <p:cNvPicPr>
+            <a:picLocks noChangeAspect="1"/>
+          </p:cNvPicPr>
+          <p:nvPr/>
+        </p:nvPicPr>
+        <p:blipFill>
+          <a:blip r:embed="rId2"/>
+          <a:stretch>
+            <a:fillRect/>
+          </a:stretch>
+        </p:blipFill>
+        <p:spPr>
+          <a:xfrm>
+            <a:off x="0" y="2215612"/>
+            <a:ext cx="12192000" cy="2426775"/>
+          </a:xfrm>
+          <a:prstGeom prst="rect">
+            <a:avLst/>
+          </a:prstGeom>
+        </p:spPr>
+      </p:pic>
+    </p:spTree>
+    <p:extLst>
+      <p:ext uri="{BB962C8B-B14F-4D97-AF65-F5344CB8AC3E}">
+        <p14:creationId xmlns:p14="http://schemas.microsoft.com/office/powerpoint/2010/main" val="2511325755"/>
       </p:ext>
     </p:extLst>
   </p:cSld>

</xml_diff>